<commit_message>
add erd to slide
</commit_message>
<xml_diff>
--- a/thuyết trình CSDL.pptx
+++ b/thuyết trình CSDL.pptx
@@ -19,19 +19,20 @@
     <p:sldId id="267" r:id="rId12"/>
     <p:sldId id="281" r:id="rId13"/>
     <p:sldId id="268" r:id="rId14"/>
-    <p:sldId id="284" r:id="rId15"/>
-    <p:sldId id="279" r:id="rId16"/>
+    <p:sldId id="286" r:id="rId15"/>
+    <p:sldId id="284" r:id="rId16"/>
+    <p:sldId id="279" r:id="rId17"/>
   </p:sldIdLst>
   <p:sldSz cx="9144000" cy="5143500" type="screen16x9"/>
   <p:notesSz cx="6858000" cy="9144000"/>
   <p:embeddedFontLst>
     <p:embeddedFont>
       <p:font typeface="Lato Light" panose="020F0502020204030203"/>
-      <p:regular r:id="rId20"/>
+      <p:regular r:id="rId21"/>
     </p:embeddedFont>
     <p:embeddedFont>
       <p:font typeface="Roboto Slab Regular"/>
-      <p:regular r:id="rId21"/>
+      <p:regular r:id="rId22"/>
     </p:embeddedFont>
   </p:embeddedFontLst>
   <p:defaultTextStyle>
@@ -33743,9 +33744,13 @@
             </a:pPr>
             <a:r>
               <a:rPr lang="en-GB" smtClean="0"/>
-              <a:t>2. Mô Tả Tập Thực Thể</a:t>
+              <a:t>2. </a:t>
             </a:r>
-            <a:endParaRPr lang="en-GB" smtClean="0"/>
+            <a:r>
+              <a:rPr lang="en-US" altLang="en-GB" smtClean="0"/>
+              <a:t>LƯỢC ĐỒ QUAN HỆ</a:t>
+            </a:r>
+            <a:endParaRPr lang="en-US" altLang="en-GB" smtClean="0"/>
           </a:p>
         </p:txBody>
       </p:sp>
@@ -33790,1747 +33795,180 @@
           </a:p>
         </p:txBody>
       </p:sp>
-      <p:graphicFrame>
-        <p:nvGraphicFramePr>
-          <p:cNvPr id="3" name="Table 2"/>
-          <p:cNvGraphicFramePr>
-            <a:graphicFrameLocks noGrp="1"/>
-          </p:cNvGraphicFramePr>
+      <p:sp>
+        <p:nvSpPr>
+          <p:cNvPr id="2" name="Text Box 1"/>
+          <p:cNvSpPr txBox="1"/>
           <p:nvPr/>
-        </p:nvGraphicFramePr>
-        <p:xfrm>
-          <a:off x="2438400" y="1276350"/>
-          <a:ext cx="5867398" cy="2960370"/>
-        </p:xfrm>
-        <a:graphic>
-          <a:graphicData uri="http://schemas.openxmlformats.org/drawingml/2006/table">
-            <a:tbl>
-              <a:tblPr firstRow="1" bandRow="1">
-                <a:tableStyleId>{C693C0B1-C3EF-405F-B1E8-830ADC564B1F}</a:tableStyleId>
-              </a:tblPr>
-              <a:tblGrid>
-                <a:gridCol w="1086555"/>
-                <a:gridCol w="1047045"/>
-                <a:gridCol w="836318"/>
-                <a:gridCol w="869244"/>
-                <a:gridCol w="579496"/>
-                <a:gridCol w="724370"/>
-                <a:gridCol w="724370"/>
-              </a:tblGrid>
-              <a:tr h="361315">
-                <a:tc>
-                  <a:txBody>
-                    <a:bodyPr/>
-                    <a:lstStyle/>
-                    <a:p>
-                      <a:r>
-                        <a:rPr lang="en-US" sz="1000" smtClean="0">
-                          <a:solidFill>
-                            <a:schemeClr val="tx1">
-                              <a:lumMod val="50000"/>
-                            </a:schemeClr>
-                          </a:solidFill>
-                        </a:rPr>
-                        <a:t>SANPHAM</a:t>
-                      </a:r>
-                      <a:endParaRPr lang="en-US" sz="1000">
-                        <a:solidFill>
-                          <a:schemeClr val="tx1">
-                            <a:lumMod val="50000"/>
-                          </a:schemeClr>
-                        </a:solidFill>
-                      </a:endParaRPr>
-                    </a:p>
-                  </a:txBody>
-                  <a:tcPr>
-                    <a:solidFill>
-                      <a:schemeClr val="bg1"/>
-                    </a:solidFill>
-                  </a:tcPr>
-                </a:tc>
-                <a:tc>
-                  <a:txBody>
-                    <a:bodyPr/>
-                    <a:lstStyle/>
-                    <a:p>
-                      <a:r>
-                        <a:rPr lang="en-US" sz="1000" smtClean="0">
-                          <a:solidFill>
-                            <a:schemeClr val="accent3">
-                              <a:lumMod val="75000"/>
-                            </a:schemeClr>
-                          </a:solidFill>
-                        </a:rPr>
-                        <a:t>MaSanPham</a:t>
-                      </a:r>
-                      <a:endParaRPr lang="en-US" sz="1000">
-                        <a:solidFill>
-                          <a:schemeClr val="accent3">
-                            <a:lumMod val="75000"/>
-                          </a:schemeClr>
-                        </a:solidFill>
-                      </a:endParaRPr>
-                    </a:p>
-                  </a:txBody>
-                  <a:tcPr>
-                    <a:solidFill>
-                      <a:schemeClr val="accent1">
-                        <a:lumMod val="20000"/>
-                        <a:lumOff val="80000"/>
-                      </a:schemeClr>
-                    </a:solidFill>
-                  </a:tcPr>
-                </a:tc>
-                <a:tc>
-                  <a:txBody>
-                    <a:bodyPr/>
-                    <a:lstStyle/>
-                    <a:p>
-                      <a:r>
-                        <a:rPr lang="en-US" sz="1000" smtClean="0">
-                          <a:solidFill>
-                            <a:schemeClr val="accent3">
-                              <a:lumMod val="75000"/>
-                            </a:schemeClr>
-                          </a:solidFill>
-                        </a:rPr>
-                        <a:t>Ten</a:t>
-                      </a:r>
-                      <a:endParaRPr lang="en-US" sz="1000">
-                        <a:solidFill>
-                          <a:schemeClr val="accent3">
-                            <a:lumMod val="75000"/>
-                          </a:schemeClr>
-                        </a:solidFill>
-                      </a:endParaRPr>
-                    </a:p>
-                  </a:txBody>
-                  <a:tcPr>
-                    <a:solidFill>
-                      <a:schemeClr val="accent1">
-                        <a:lumMod val="20000"/>
-                        <a:lumOff val="80000"/>
-                      </a:schemeClr>
-                    </a:solidFill>
-                  </a:tcPr>
-                </a:tc>
-                <a:tc>
-                  <a:txBody>
-                    <a:bodyPr/>
-                    <a:lstStyle/>
-                    <a:p>
-                      <a:r>
-                        <a:rPr lang="en-US" sz="1000" smtClean="0">
-                          <a:solidFill>
-                            <a:schemeClr val="accent3">
-                              <a:lumMod val="75000"/>
-                            </a:schemeClr>
-                          </a:solidFill>
-                        </a:rPr>
-                        <a:t>SoLuong</a:t>
-                      </a:r>
-                      <a:endParaRPr lang="en-US" sz="1000">
-                        <a:solidFill>
-                          <a:schemeClr val="accent3">
-                            <a:lumMod val="75000"/>
-                          </a:schemeClr>
-                        </a:solidFill>
-                      </a:endParaRPr>
-                    </a:p>
-                  </a:txBody>
-                  <a:tcPr>
-                    <a:solidFill>
-                      <a:schemeClr val="accent1">
-                        <a:lumMod val="20000"/>
-                        <a:lumOff val="80000"/>
-                      </a:schemeClr>
-                    </a:solidFill>
-                  </a:tcPr>
-                </a:tc>
-                <a:tc>
-                  <a:txBody>
-                    <a:bodyPr/>
-                    <a:lstStyle/>
-                    <a:p>
-                      <a:r>
-                        <a:rPr lang="en-US" sz="1000" smtClean="0">
-                          <a:solidFill>
-                            <a:schemeClr val="accent3">
-                              <a:lumMod val="75000"/>
-                            </a:schemeClr>
-                          </a:solidFill>
-                        </a:rPr>
-                        <a:t>Gia</a:t>
-                      </a:r>
-                      <a:endParaRPr lang="en-US" sz="1000">
-                        <a:solidFill>
-                          <a:schemeClr val="accent3">
-                            <a:lumMod val="75000"/>
-                          </a:schemeClr>
-                        </a:solidFill>
-                      </a:endParaRPr>
-                    </a:p>
-                  </a:txBody>
-                  <a:tcPr>
-                    <a:solidFill>
-                      <a:schemeClr val="accent1">
-                        <a:lumMod val="20000"/>
-                        <a:lumOff val="80000"/>
-                      </a:schemeClr>
-                    </a:solidFill>
-                  </a:tcPr>
-                </a:tc>
-                <a:tc>
-                  <a:txBody>
-                    <a:bodyPr/>
-                    <a:lstStyle/>
-                    <a:p>
-                      <a:endParaRPr lang="en-US" sz="1000">
-                        <a:solidFill>
-                          <a:schemeClr val="accent3">
-                            <a:lumMod val="75000"/>
-                          </a:schemeClr>
-                        </a:solidFill>
-                      </a:endParaRPr>
-                    </a:p>
-                  </a:txBody>
-                  <a:tcPr>
-                    <a:solidFill>
-                      <a:schemeClr val="accent1">
-                        <a:lumMod val="20000"/>
-                        <a:lumOff val="80000"/>
-                      </a:schemeClr>
-                    </a:solidFill>
-                  </a:tcPr>
-                </a:tc>
-                <a:tc>
-                  <a:txBody>
-                    <a:bodyPr/>
-                    <a:lstStyle/>
-                    <a:p>
-                      <a:endParaRPr lang="en-US" sz="1000">
-                        <a:solidFill>
-                          <a:schemeClr val="accent3">
-                            <a:lumMod val="75000"/>
-                          </a:schemeClr>
-                        </a:solidFill>
-                      </a:endParaRPr>
-                    </a:p>
-                  </a:txBody>
-                  <a:tcPr>
-                    <a:solidFill>
-                      <a:schemeClr val="accent1">
-                        <a:lumMod val="20000"/>
-                        <a:lumOff val="80000"/>
-                      </a:schemeClr>
-                    </a:solidFill>
-                  </a:tcPr>
-                </a:tc>
-              </a:tr>
-              <a:tr h="361315">
-                <a:tc>
-                  <a:txBody>
-                    <a:bodyPr/>
-                    <a:lstStyle/>
-                    <a:p>
-                      <a:r>
-                        <a:rPr lang="en-US" sz="1000" smtClean="0">
-                          <a:solidFill>
-                            <a:schemeClr val="tx1">
-                              <a:lumMod val="50000"/>
-                            </a:schemeClr>
-                          </a:solidFill>
-                        </a:rPr>
-                        <a:t>NHACUNGCAP</a:t>
-                      </a:r>
-                      <a:endParaRPr lang="en-US" sz="1000">
-                        <a:solidFill>
-                          <a:schemeClr val="tx1">
-                            <a:lumMod val="50000"/>
-                          </a:schemeClr>
-                        </a:solidFill>
-                      </a:endParaRPr>
-                    </a:p>
-                  </a:txBody>
-                  <a:tcPr>
-                    <a:solidFill>
-                      <a:schemeClr val="bg1"/>
-                    </a:solidFill>
-                  </a:tcPr>
-                </a:tc>
-                <a:tc>
-                  <a:txBody>
-                    <a:bodyPr/>
-                    <a:lstStyle/>
-                    <a:p>
-                      <a:r>
-                        <a:rPr lang="en-US" sz="1000" smtClean="0">
-                          <a:solidFill>
-                            <a:schemeClr val="accent3">
-                              <a:lumMod val="75000"/>
-                            </a:schemeClr>
-                          </a:solidFill>
-                        </a:rPr>
-                        <a:t>MaNhaCungCap</a:t>
-                      </a:r>
-                      <a:endParaRPr lang="en-US" sz="1000">
-                        <a:solidFill>
-                          <a:schemeClr val="accent3">
-                            <a:lumMod val="75000"/>
-                          </a:schemeClr>
-                        </a:solidFill>
-                      </a:endParaRPr>
-                    </a:p>
-                  </a:txBody>
-                  <a:tcPr>
-                    <a:solidFill>
-                      <a:schemeClr val="accent1">
-                        <a:lumMod val="20000"/>
-                        <a:lumOff val="80000"/>
-                      </a:schemeClr>
-                    </a:solidFill>
-                  </a:tcPr>
-                </a:tc>
-                <a:tc>
-                  <a:txBody>
-                    <a:bodyPr/>
-                    <a:lstStyle/>
-                    <a:p>
-                      <a:r>
-                        <a:rPr lang="en-US" sz="1000" smtClean="0">
-                          <a:solidFill>
-                            <a:schemeClr val="accent3">
-                              <a:lumMod val="75000"/>
-                            </a:schemeClr>
-                          </a:solidFill>
-                        </a:rPr>
-                        <a:t>Ten</a:t>
-                      </a:r>
-                      <a:endParaRPr lang="en-US" sz="1000">
-                        <a:solidFill>
-                          <a:schemeClr val="accent3">
-                            <a:lumMod val="75000"/>
-                          </a:schemeClr>
-                        </a:solidFill>
-                      </a:endParaRPr>
-                    </a:p>
-                  </a:txBody>
-                  <a:tcPr>
-                    <a:solidFill>
-                      <a:schemeClr val="accent1">
-                        <a:lumMod val="20000"/>
-                        <a:lumOff val="80000"/>
-                      </a:schemeClr>
-                    </a:solidFill>
-                  </a:tcPr>
-                </a:tc>
-                <a:tc>
-                  <a:txBody>
-                    <a:bodyPr/>
-                    <a:lstStyle/>
-                    <a:p>
-                      <a:r>
-                        <a:rPr lang="en-US" sz="1000" smtClean="0">
-                          <a:solidFill>
-                            <a:schemeClr val="accent3">
-                              <a:lumMod val="75000"/>
-                            </a:schemeClr>
-                          </a:solidFill>
-                        </a:rPr>
-                        <a:t>Diachi</a:t>
-                      </a:r>
-                      <a:endParaRPr lang="en-US" sz="1000">
-                        <a:solidFill>
-                          <a:schemeClr val="accent3">
-                            <a:lumMod val="75000"/>
-                          </a:schemeClr>
-                        </a:solidFill>
-                      </a:endParaRPr>
-                    </a:p>
-                  </a:txBody>
-                  <a:tcPr>
-                    <a:solidFill>
-                      <a:schemeClr val="accent1">
-                        <a:lumMod val="20000"/>
-                        <a:lumOff val="80000"/>
-                      </a:schemeClr>
-                    </a:solidFill>
-                  </a:tcPr>
-                </a:tc>
-                <a:tc>
-                  <a:txBody>
-                    <a:bodyPr/>
-                    <a:lstStyle/>
-                    <a:p>
-                      <a:r>
-                        <a:rPr lang="en-US" sz="1000" smtClean="0">
-                          <a:solidFill>
-                            <a:schemeClr val="accent3">
-                              <a:lumMod val="75000"/>
-                            </a:schemeClr>
-                          </a:solidFill>
-                        </a:rPr>
-                        <a:t>SDT</a:t>
-                      </a:r>
-                      <a:endParaRPr lang="en-US" sz="1000">
-                        <a:solidFill>
-                          <a:schemeClr val="accent3">
-                            <a:lumMod val="75000"/>
-                          </a:schemeClr>
-                        </a:solidFill>
-                      </a:endParaRPr>
-                    </a:p>
-                  </a:txBody>
-                  <a:tcPr>
-                    <a:solidFill>
-                      <a:schemeClr val="accent1">
-                        <a:lumMod val="20000"/>
-                        <a:lumOff val="80000"/>
-                      </a:schemeClr>
-                    </a:solidFill>
-                  </a:tcPr>
-                </a:tc>
-                <a:tc>
-                  <a:txBody>
-                    <a:bodyPr/>
-                    <a:lstStyle/>
-                    <a:p>
-                      <a:endParaRPr lang="en-US" sz="1000">
-                        <a:solidFill>
-                          <a:schemeClr val="accent3">
-                            <a:lumMod val="75000"/>
-                          </a:schemeClr>
-                        </a:solidFill>
-                      </a:endParaRPr>
-                    </a:p>
-                  </a:txBody>
-                  <a:tcPr>
-                    <a:solidFill>
-                      <a:schemeClr val="accent1">
-                        <a:lumMod val="20000"/>
-                        <a:lumOff val="80000"/>
-                      </a:schemeClr>
-                    </a:solidFill>
-                  </a:tcPr>
-                </a:tc>
-                <a:tc>
-                  <a:txBody>
-                    <a:bodyPr/>
-                    <a:lstStyle/>
-                    <a:p>
-                      <a:endParaRPr lang="en-US" sz="1000">
-                        <a:solidFill>
-                          <a:schemeClr val="accent3">
-                            <a:lumMod val="75000"/>
-                          </a:schemeClr>
-                        </a:solidFill>
-                      </a:endParaRPr>
-                    </a:p>
-                  </a:txBody>
-                  <a:tcPr>
-                    <a:solidFill>
-                      <a:schemeClr val="accent1">
-                        <a:lumMod val="20000"/>
-                        <a:lumOff val="80000"/>
-                      </a:schemeClr>
-                    </a:solidFill>
-                  </a:tcPr>
-                </a:tc>
-              </a:tr>
-              <a:tr h="361315">
-                <a:tc>
-                  <a:txBody>
-                    <a:bodyPr/>
-                    <a:lstStyle/>
-                    <a:p>
-                      <a:r>
-                        <a:rPr lang="en-US" sz="1000" smtClean="0">
-                          <a:solidFill>
-                            <a:schemeClr val="tx1">
-                              <a:lumMod val="50000"/>
-                            </a:schemeClr>
-                          </a:solidFill>
-                        </a:rPr>
-                        <a:t>HANG</a:t>
-                      </a:r>
-                      <a:endParaRPr lang="en-US" sz="1000">
-                        <a:solidFill>
-                          <a:schemeClr val="tx1">
-                            <a:lumMod val="50000"/>
-                          </a:schemeClr>
-                        </a:solidFill>
-                      </a:endParaRPr>
-                    </a:p>
-                  </a:txBody>
-                  <a:tcPr>
-                    <a:solidFill>
-                      <a:schemeClr val="bg1"/>
-                    </a:solidFill>
-                  </a:tcPr>
-                </a:tc>
-                <a:tc>
-                  <a:txBody>
-                    <a:bodyPr/>
-                    <a:lstStyle/>
-                    <a:p>
-                      <a:r>
-                        <a:rPr lang="en-US" sz="1000" smtClean="0">
-                          <a:solidFill>
-                            <a:schemeClr val="accent3">
-                              <a:lumMod val="75000"/>
-                            </a:schemeClr>
-                          </a:solidFill>
-                        </a:rPr>
-                        <a:t>MaHang</a:t>
-                      </a:r>
-                      <a:endParaRPr lang="en-US" sz="1000">
-                        <a:solidFill>
-                          <a:schemeClr val="accent3">
-                            <a:lumMod val="75000"/>
-                          </a:schemeClr>
-                        </a:solidFill>
-                      </a:endParaRPr>
-                    </a:p>
-                  </a:txBody>
-                  <a:tcPr>
-                    <a:solidFill>
-                      <a:schemeClr val="accent1">
-                        <a:lumMod val="20000"/>
-                        <a:lumOff val="80000"/>
-                      </a:schemeClr>
-                    </a:solidFill>
-                  </a:tcPr>
-                </a:tc>
-                <a:tc>
-                  <a:txBody>
-                    <a:bodyPr/>
-                    <a:lstStyle/>
-                    <a:p>
-                      <a:r>
-                        <a:rPr lang="en-US" sz="1000" smtClean="0">
-                          <a:solidFill>
-                            <a:schemeClr val="accent3">
-                              <a:lumMod val="75000"/>
-                            </a:schemeClr>
-                          </a:solidFill>
-                        </a:rPr>
-                        <a:t>Ten</a:t>
-                      </a:r>
-                      <a:endParaRPr lang="en-US" sz="1000">
-                        <a:solidFill>
-                          <a:schemeClr val="accent3">
-                            <a:lumMod val="75000"/>
-                          </a:schemeClr>
-                        </a:solidFill>
-                      </a:endParaRPr>
-                    </a:p>
-                  </a:txBody>
-                  <a:tcPr>
-                    <a:solidFill>
-                      <a:schemeClr val="accent1">
-                        <a:lumMod val="20000"/>
-                        <a:lumOff val="80000"/>
-                      </a:schemeClr>
-                    </a:solidFill>
-                  </a:tcPr>
-                </a:tc>
-                <a:tc>
-                  <a:txBody>
-                    <a:bodyPr/>
-                    <a:lstStyle/>
-                    <a:p>
-                      <a:endParaRPr lang="en-US" sz="1000">
-                        <a:solidFill>
-                          <a:schemeClr val="accent3">
-                            <a:lumMod val="75000"/>
-                          </a:schemeClr>
-                        </a:solidFill>
-                      </a:endParaRPr>
-                    </a:p>
-                  </a:txBody>
-                  <a:tcPr>
-                    <a:solidFill>
-                      <a:schemeClr val="accent1">
-                        <a:lumMod val="20000"/>
-                        <a:lumOff val="80000"/>
-                      </a:schemeClr>
-                    </a:solidFill>
-                  </a:tcPr>
-                </a:tc>
-                <a:tc>
-                  <a:txBody>
-                    <a:bodyPr/>
-                    <a:lstStyle/>
-                    <a:p>
-                      <a:endParaRPr lang="en-US" sz="1000">
-                        <a:solidFill>
-                          <a:schemeClr val="accent3">
-                            <a:lumMod val="75000"/>
-                          </a:schemeClr>
-                        </a:solidFill>
-                      </a:endParaRPr>
-                    </a:p>
-                  </a:txBody>
-                  <a:tcPr>
-                    <a:solidFill>
-                      <a:schemeClr val="accent1">
-                        <a:lumMod val="20000"/>
-                        <a:lumOff val="80000"/>
-                      </a:schemeClr>
-                    </a:solidFill>
-                  </a:tcPr>
-                </a:tc>
-                <a:tc>
-                  <a:txBody>
-                    <a:bodyPr/>
-                    <a:lstStyle/>
-                    <a:p>
-                      <a:endParaRPr lang="en-US" sz="1000">
-                        <a:solidFill>
-                          <a:schemeClr val="accent3">
-                            <a:lumMod val="75000"/>
-                          </a:schemeClr>
-                        </a:solidFill>
-                      </a:endParaRPr>
-                    </a:p>
-                  </a:txBody>
-                  <a:tcPr>
-                    <a:solidFill>
-                      <a:schemeClr val="accent1">
-                        <a:lumMod val="20000"/>
-                        <a:lumOff val="80000"/>
-                      </a:schemeClr>
-                    </a:solidFill>
-                  </a:tcPr>
-                </a:tc>
-                <a:tc>
-                  <a:txBody>
-                    <a:bodyPr/>
-                    <a:lstStyle/>
-                    <a:p>
-                      <a:endParaRPr lang="en-US" sz="1000">
-                        <a:solidFill>
-                          <a:schemeClr val="accent3">
-                            <a:lumMod val="75000"/>
-                          </a:schemeClr>
-                        </a:solidFill>
-                      </a:endParaRPr>
-                    </a:p>
-                  </a:txBody>
-                  <a:tcPr>
-                    <a:solidFill>
-                      <a:schemeClr val="accent1">
-                        <a:lumMod val="20000"/>
-                        <a:lumOff val="80000"/>
-                      </a:schemeClr>
-                    </a:solidFill>
-                  </a:tcPr>
-                </a:tc>
-              </a:tr>
-              <a:tr h="361315">
-                <a:tc>
-                  <a:txBody>
-                    <a:bodyPr/>
-                    <a:lstStyle/>
-                    <a:p>
-                      <a:r>
-                        <a:rPr lang="en-US" sz="1000" smtClean="0">
-                          <a:solidFill>
-                            <a:schemeClr val="tx1">
-                              <a:lumMod val="50000"/>
-                            </a:schemeClr>
-                          </a:solidFill>
-                        </a:rPr>
-                        <a:t>HOADON</a:t>
-                      </a:r>
-                      <a:endParaRPr lang="en-US" sz="1000">
-                        <a:solidFill>
-                          <a:schemeClr val="tx1">
-                            <a:lumMod val="50000"/>
-                          </a:schemeClr>
-                        </a:solidFill>
-                      </a:endParaRPr>
-                    </a:p>
-                  </a:txBody>
-                  <a:tcPr>
-                    <a:solidFill>
-                      <a:schemeClr val="bg1"/>
-                    </a:solidFill>
-                  </a:tcPr>
-                </a:tc>
-                <a:tc>
-                  <a:txBody>
-                    <a:bodyPr/>
-                    <a:lstStyle/>
-                    <a:p>
-                      <a:r>
-                        <a:rPr lang="en-US" sz="1000" smtClean="0">
-                          <a:solidFill>
-                            <a:schemeClr val="accent3">
-                              <a:lumMod val="75000"/>
-                            </a:schemeClr>
-                          </a:solidFill>
-                        </a:rPr>
-                        <a:t>MaHoaDon</a:t>
-                      </a:r>
-                      <a:endParaRPr lang="en-US" sz="1000">
-                        <a:solidFill>
-                          <a:schemeClr val="accent3">
-                            <a:lumMod val="75000"/>
-                          </a:schemeClr>
-                        </a:solidFill>
-                      </a:endParaRPr>
-                    </a:p>
-                  </a:txBody>
-                  <a:tcPr>
-                    <a:solidFill>
-                      <a:schemeClr val="accent1">
-                        <a:lumMod val="20000"/>
-                        <a:lumOff val="80000"/>
-                      </a:schemeClr>
-                    </a:solidFill>
-                  </a:tcPr>
-                </a:tc>
-                <a:tc>
-                  <a:txBody>
-                    <a:bodyPr/>
-                    <a:lstStyle/>
-                    <a:p>
-                      <a:r>
-                        <a:rPr lang="en-US" sz="1000" smtClean="0">
-                          <a:solidFill>
-                            <a:schemeClr val="accent3">
-                              <a:lumMod val="75000"/>
-                            </a:schemeClr>
-                          </a:solidFill>
-                        </a:rPr>
-                        <a:t>TongTien</a:t>
-                      </a:r>
-                      <a:endParaRPr lang="en-US" sz="1000">
-                        <a:solidFill>
-                          <a:schemeClr val="accent3">
-                            <a:lumMod val="75000"/>
-                          </a:schemeClr>
-                        </a:solidFill>
-                      </a:endParaRPr>
-                    </a:p>
-                  </a:txBody>
-                  <a:tcPr>
-                    <a:solidFill>
-                      <a:schemeClr val="accent1">
-                        <a:lumMod val="20000"/>
-                        <a:lumOff val="80000"/>
-                      </a:schemeClr>
-                    </a:solidFill>
-                  </a:tcPr>
-                </a:tc>
-                <a:tc>
-                  <a:txBody>
-                    <a:bodyPr/>
-                    <a:lstStyle/>
-                    <a:p>
-                      <a:r>
-                        <a:rPr lang="en-US" sz="1000" smtClean="0">
-                          <a:solidFill>
-                            <a:schemeClr val="accent3">
-                              <a:lumMod val="75000"/>
-                            </a:schemeClr>
-                          </a:solidFill>
-                        </a:rPr>
-                        <a:t>DiaChi</a:t>
-                      </a:r>
-                      <a:endParaRPr lang="en-US" sz="1000">
-                        <a:solidFill>
-                          <a:schemeClr val="accent3">
-                            <a:lumMod val="75000"/>
-                          </a:schemeClr>
-                        </a:solidFill>
-                      </a:endParaRPr>
-                    </a:p>
-                  </a:txBody>
-                  <a:tcPr>
-                    <a:solidFill>
-                      <a:schemeClr val="accent1">
-                        <a:lumMod val="20000"/>
-                        <a:lumOff val="80000"/>
-                      </a:schemeClr>
-                    </a:solidFill>
-                  </a:tcPr>
-                </a:tc>
-                <a:tc>
-                  <a:txBody>
-                    <a:bodyPr/>
-                    <a:lstStyle/>
-                    <a:p>
-                      <a:r>
-                        <a:rPr lang="en-US" sz="1000" smtClean="0">
-                          <a:solidFill>
-                            <a:schemeClr val="accent3">
-                              <a:lumMod val="75000"/>
-                            </a:schemeClr>
-                          </a:solidFill>
-                        </a:rPr>
-                        <a:t>Ngay</a:t>
-                      </a:r>
-                      <a:endParaRPr lang="en-US" sz="1000">
-                        <a:solidFill>
-                          <a:schemeClr val="accent3">
-                            <a:lumMod val="75000"/>
-                          </a:schemeClr>
-                        </a:solidFill>
-                      </a:endParaRPr>
-                    </a:p>
-                  </a:txBody>
-                  <a:tcPr>
-                    <a:solidFill>
-                      <a:schemeClr val="accent1">
-                        <a:lumMod val="20000"/>
-                        <a:lumOff val="80000"/>
-                      </a:schemeClr>
-                    </a:solidFill>
-                  </a:tcPr>
-                </a:tc>
-                <a:tc>
-                  <a:txBody>
-                    <a:bodyPr/>
-                    <a:lstStyle/>
-                    <a:p>
-                      <a:r>
-                        <a:rPr lang="en-US" sz="1000" smtClean="0">
-                          <a:solidFill>
-                            <a:schemeClr val="accent3">
-                              <a:lumMod val="75000"/>
-                            </a:schemeClr>
-                          </a:solidFill>
-                        </a:rPr>
-                        <a:t>TienShip</a:t>
-                      </a:r>
-                      <a:endParaRPr lang="en-US" sz="1000">
-                        <a:solidFill>
-                          <a:schemeClr val="accent3">
-                            <a:lumMod val="75000"/>
-                          </a:schemeClr>
-                        </a:solidFill>
-                      </a:endParaRPr>
-                    </a:p>
-                  </a:txBody>
-                  <a:tcPr>
-                    <a:solidFill>
-                      <a:schemeClr val="accent1">
-                        <a:lumMod val="20000"/>
-                        <a:lumOff val="80000"/>
-                      </a:schemeClr>
-                    </a:solidFill>
-                  </a:tcPr>
-                </a:tc>
-                <a:tc>
-                  <a:txBody>
-                    <a:bodyPr/>
-                    <a:lstStyle/>
-                    <a:p>
-                      <a:endParaRPr lang="en-US" sz="1000">
-                        <a:solidFill>
-                          <a:schemeClr val="accent3">
-                            <a:lumMod val="75000"/>
-                          </a:schemeClr>
-                        </a:solidFill>
-                      </a:endParaRPr>
-                    </a:p>
-                  </a:txBody>
-                  <a:tcPr>
-                    <a:solidFill>
-                      <a:schemeClr val="accent1">
-                        <a:lumMod val="20000"/>
-                        <a:lumOff val="80000"/>
-                      </a:schemeClr>
-                    </a:solidFill>
-                  </a:tcPr>
-                </a:tc>
-              </a:tr>
-              <a:tr h="361315">
-                <a:tc>
-                  <a:txBody>
-                    <a:bodyPr/>
-                    <a:lstStyle/>
-                    <a:p>
-                      <a:r>
-                        <a:rPr lang="en-US" sz="1000" smtClean="0">
-                          <a:solidFill>
-                            <a:schemeClr val="tx1">
-                              <a:lumMod val="50000"/>
-                            </a:schemeClr>
-                          </a:solidFill>
-                        </a:rPr>
-                        <a:t>CHITIETHD</a:t>
-                      </a:r>
-                      <a:endParaRPr lang="en-US" sz="1000">
-                        <a:solidFill>
-                          <a:schemeClr val="tx1">
-                            <a:lumMod val="50000"/>
-                          </a:schemeClr>
-                        </a:solidFill>
-                      </a:endParaRPr>
-                    </a:p>
-                  </a:txBody>
-                  <a:tcPr>
-                    <a:solidFill>
-                      <a:schemeClr val="bg1"/>
-                    </a:solidFill>
-                  </a:tcPr>
-                </a:tc>
-                <a:tc>
-                  <a:txBody>
-                    <a:bodyPr/>
-                    <a:lstStyle/>
-                    <a:p>
-                      <a:r>
-                        <a:rPr lang="en-US" sz="1000" smtClean="0">
-                          <a:solidFill>
-                            <a:schemeClr val="accent3">
-                              <a:lumMod val="75000"/>
-                            </a:schemeClr>
-                          </a:solidFill>
-                        </a:rPr>
-                        <a:t>MaChiTietHD</a:t>
-                      </a:r>
-                      <a:endParaRPr lang="en-US" sz="1000">
-                        <a:solidFill>
-                          <a:schemeClr val="accent3">
-                            <a:lumMod val="75000"/>
-                          </a:schemeClr>
-                        </a:solidFill>
-                      </a:endParaRPr>
-                    </a:p>
-                  </a:txBody>
-                  <a:tcPr>
-                    <a:solidFill>
-                      <a:schemeClr val="accent1">
-                        <a:lumMod val="20000"/>
-                        <a:lumOff val="80000"/>
-                      </a:schemeClr>
-                    </a:solidFill>
-                  </a:tcPr>
-                </a:tc>
-                <a:tc>
-                  <a:txBody>
-                    <a:bodyPr/>
-                    <a:lstStyle/>
-                    <a:p>
-                      <a:r>
-                        <a:rPr lang="en-US" sz="1000" smtClean="0">
-                          <a:solidFill>
-                            <a:schemeClr val="accent3">
-                              <a:lumMod val="75000"/>
-                            </a:schemeClr>
-                          </a:solidFill>
-                        </a:rPr>
-                        <a:t>SoLuong</a:t>
-                      </a:r>
-                      <a:endParaRPr lang="en-US" sz="1000">
-                        <a:solidFill>
-                          <a:schemeClr val="accent3">
-                            <a:lumMod val="75000"/>
-                          </a:schemeClr>
-                        </a:solidFill>
-                      </a:endParaRPr>
-                    </a:p>
-                  </a:txBody>
-                  <a:tcPr>
-                    <a:solidFill>
-                      <a:schemeClr val="accent1">
-                        <a:lumMod val="20000"/>
-                        <a:lumOff val="80000"/>
-                      </a:schemeClr>
-                    </a:solidFill>
-                  </a:tcPr>
-                </a:tc>
-                <a:tc>
-                  <a:txBody>
-                    <a:bodyPr/>
-                    <a:lstStyle/>
-                    <a:p>
-                      <a:r>
-                        <a:rPr lang="en-US" sz="1000" smtClean="0">
-                          <a:solidFill>
-                            <a:schemeClr val="accent3">
-                              <a:lumMod val="75000"/>
-                            </a:schemeClr>
-                          </a:solidFill>
-                        </a:rPr>
-                        <a:t>ThanhTien</a:t>
-                      </a:r>
-                      <a:endParaRPr lang="en-US" sz="1000">
-                        <a:solidFill>
-                          <a:schemeClr val="accent3">
-                            <a:lumMod val="75000"/>
-                          </a:schemeClr>
-                        </a:solidFill>
-                      </a:endParaRPr>
-                    </a:p>
-                  </a:txBody>
-                  <a:tcPr>
-                    <a:solidFill>
-                      <a:schemeClr val="accent1">
-                        <a:lumMod val="20000"/>
-                        <a:lumOff val="80000"/>
-                      </a:schemeClr>
-                    </a:solidFill>
-                  </a:tcPr>
-                </a:tc>
-                <a:tc>
-                  <a:txBody>
-                    <a:bodyPr/>
-                    <a:lstStyle/>
-                    <a:p>
-                      <a:endParaRPr lang="en-US" sz="1000">
-                        <a:solidFill>
-                          <a:schemeClr val="accent3">
-                            <a:lumMod val="75000"/>
-                          </a:schemeClr>
-                        </a:solidFill>
-                      </a:endParaRPr>
-                    </a:p>
-                  </a:txBody>
-                  <a:tcPr>
-                    <a:solidFill>
-                      <a:schemeClr val="accent1">
-                        <a:lumMod val="20000"/>
-                        <a:lumOff val="80000"/>
-                      </a:schemeClr>
-                    </a:solidFill>
-                  </a:tcPr>
-                </a:tc>
-                <a:tc>
-                  <a:txBody>
-                    <a:bodyPr/>
-                    <a:lstStyle/>
-                    <a:p>
-                      <a:endParaRPr lang="en-US" sz="1000">
-                        <a:solidFill>
-                          <a:schemeClr val="accent3">
-                            <a:lumMod val="75000"/>
-                          </a:schemeClr>
-                        </a:solidFill>
-                      </a:endParaRPr>
-                    </a:p>
-                  </a:txBody>
-                  <a:tcPr>
-                    <a:solidFill>
-                      <a:schemeClr val="accent1">
-                        <a:lumMod val="20000"/>
-                        <a:lumOff val="80000"/>
-                      </a:schemeClr>
-                    </a:solidFill>
-                  </a:tcPr>
-                </a:tc>
-                <a:tc>
-                  <a:txBody>
-                    <a:bodyPr/>
-                    <a:lstStyle/>
-                    <a:p>
-                      <a:endParaRPr lang="en-US" sz="1000">
-                        <a:solidFill>
-                          <a:schemeClr val="accent3">
-                            <a:lumMod val="75000"/>
-                          </a:schemeClr>
-                        </a:solidFill>
-                      </a:endParaRPr>
-                    </a:p>
-                  </a:txBody>
-                  <a:tcPr>
-                    <a:solidFill>
-                      <a:schemeClr val="accent1">
-                        <a:lumMod val="20000"/>
-                        <a:lumOff val="80000"/>
-                      </a:schemeClr>
-                    </a:solidFill>
-                  </a:tcPr>
-                </a:tc>
-              </a:tr>
-              <a:tr h="361315">
-                <a:tc>
-                  <a:txBody>
-                    <a:bodyPr/>
-                    <a:lstStyle/>
-                    <a:p>
-                      <a:r>
-                        <a:rPr lang="en-US" sz="1000" smtClean="0">
-                          <a:solidFill>
-                            <a:schemeClr val="tx1">
-                              <a:lumMod val="50000"/>
-                            </a:schemeClr>
-                          </a:solidFill>
-                        </a:rPr>
-                        <a:t>MAGIAMGIA</a:t>
-                      </a:r>
-                      <a:endParaRPr lang="en-US" sz="1000">
-                        <a:solidFill>
-                          <a:schemeClr val="tx1">
-                            <a:lumMod val="50000"/>
-                          </a:schemeClr>
-                        </a:solidFill>
-                      </a:endParaRPr>
-                    </a:p>
-                  </a:txBody>
-                  <a:tcPr>
-                    <a:solidFill>
-                      <a:schemeClr val="bg1"/>
-                    </a:solidFill>
-                  </a:tcPr>
-                </a:tc>
-                <a:tc>
-                  <a:txBody>
-                    <a:bodyPr/>
-                    <a:lstStyle/>
-                    <a:p>
-                      <a:r>
-                        <a:rPr lang="en-US" sz="1000" smtClean="0">
-                          <a:solidFill>
-                            <a:schemeClr val="accent3">
-                              <a:lumMod val="75000"/>
-                            </a:schemeClr>
-                          </a:solidFill>
-                        </a:rPr>
-                        <a:t>MaGG</a:t>
-                      </a:r>
-                      <a:endParaRPr lang="en-US" sz="1000">
-                        <a:solidFill>
-                          <a:schemeClr val="accent3">
-                            <a:lumMod val="75000"/>
-                          </a:schemeClr>
-                        </a:solidFill>
-                      </a:endParaRPr>
-                    </a:p>
-                  </a:txBody>
-                  <a:tcPr>
-                    <a:solidFill>
-                      <a:schemeClr val="accent1">
-                        <a:lumMod val="20000"/>
-                        <a:lumOff val="80000"/>
-                      </a:schemeClr>
-                    </a:solidFill>
-                  </a:tcPr>
-                </a:tc>
-                <a:tc>
-                  <a:txBody>
-                    <a:bodyPr/>
-                    <a:lstStyle/>
-                    <a:p>
-                      <a:r>
-                        <a:rPr lang="en-US" sz="1000" smtClean="0">
-                          <a:solidFill>
-                            <a:schemeClr val="accent3">
-                              <a:lumMod val="75000"/>
-                            </a:schemeClr>
-                          </a:solidFill>
-                        </a:rPr>
-                        <a:t>SoLuong</a:t>
-                      </a:r>
-                      <a:endParaRPr lang="en-US" sz="1000">
-                        <a:solidFill>
-                          <a:schemeClr val="accent3">
-                            <a:lumMod val="75000"/>
-                          </a:schemeClr>
-                        </a:solidFill>
-                      </a:endParaRPr>
-                    </a:p>
-                  </a:txBody>
-                  <a:tcPr>
-                    <a:solidFill>
-                      <a:schemeClr val="accent1">
-                        <a:lumMod val="20000"/>
-                        <a:lumOff val="80000"/>
-                      </a:schemeClr>
-                    </a:solidFill>
-                  </a:tcPr>
-                </a:tc>
-                <a:tc>
-                  <a:txBody>
-                    <a:bodyPr/>
-                    <a:lstStyle/>
-                    <a:p>
-                      <a:r>
-                        <a:rPr lang="en-US" sz="1000" smtClean="0">
-                          <a:solidFill>
-                            <a:schemeClr val="accent3">
-                              <a:lumMod val="75000"/>
-                            </a:schemeClr>
-                          </a:solidFill>
-                        </a:rPr>
-                        <a:t>SoTienGiam</a:t>
-                      </a:r>
-                      <a:endParaRPr lang="en-US" sz="1000">
-                        <a:solidFill>
-                          <a:schemeClr val="accent3">
-                            <a:lumMod val="75000"/>
-                          </a:schemeClr>
-                        </a:solidFill>
-                      </a:endParaRPr>
-                    </a:p>
-                  </a:txBody>
-                  <a:tcPr>
-                    <a:solidFill>
-                      <a:schemeClr val="accent1">
-                        <a:lumMod val="20000"/>
-                        <a:lumOff val="80000"/>
-                      </a:schemeClr>
-                    </a:solidFill>
-                  </a:tcPr>
-                </a:tc>
-                <a:tc>
-                  <a:txBody>
-                    <a:bodyPr/>
-                    <a:lstStyle/>
-                    <a:p>
-                      <a:r>
-                        <a:rPr lang="en-US" sz="1000" smtClean="0">
-                          <a:solidFill>
-                            <a:schemeClr val="accent3">
-                              <a:lumMod val="75000"/>
-                            </a:schemeClr>
-                          </a:solidFill>
-                        </a:rPr>
-                        <a:t>HSD</a:t>
-                      </a:r>
-                      <a:endParaRPr lang="en-US" sz="1000">
-                        <a:solidFill>
-                          <a:schemeClr val="accent3">
-                            <a:lumMod val="75000"/>
-                          </a:schemeClr>
-                        </a:solidFill>
-                      </a:endParaRPr>
-                    </a:p>
-                  </a:txBody>
-                  <a:tcPr>
-                    <a:solidFill>
-                      <a:schemeClr val="accent1">
-                        <a:lumMod val="20000"/>
-                        <a:lumOff val="80000"/>
-                      </a:schemeClr>
-                    </a:solidFill>
-                  </a:tcPr>
-                </a:tc>
-                <a:tc>
-                  <a:txBody>
-                    <a:bodyPr/>
-                    <a:lstStyle/>
-                    <a:p>
-                      <a:r>
-                        <a:rPr lang="en-US" sz="1000" smtClean="0">
-                          <a:solidFill>
-                            <a:schemeClr val="accent3">
-                              <a:lumMod val="75000"/>
-                            </a:schemeClr>
-                          </a:solidFill>
-                        </a:rPr>
-                        <a:t>Code</a:t>
-                      </a:r>
-                      <a:endParaRPr lang="en-US" sz="1000">
-                        <a:solidFill>
-                          <a:schemeClr val="accent3">
-                            <a:lumMod val="75000"/>
-                          </a:schemeClr>
-                        </a:solidFill>
-                      </a:endParaRPr>
-                    </a:p>
-                  </a:txBody>
-                  <a:tcPr>
-                    <a:solidFill>
-                      <a:schemeClr val="accent1">
-                        <a:lumMod val="20000"/>
-                        <a:lumOff val="80000"/>
-                      </a:schemeClr>
-                    </a:solidFill>
-                  </a:tcPr>
-                </a:tc>
-                <a:tc>
-                  <a:txBody>
-                    <a:bodyPr/>
-                    <a:lstStyle/>
-                    <a:p>
-                      <a:endParaRPr lang="en-US" sz="1000">
-                        <a:solidFill>
-                          <a:schemeClr val="accent3">
-                            <a:lumMod val="75000"/>
-                          </a:schemeClr>
-                        </a:solidFill>
-                      </a:endParaRPr>
-                    </a:p>
-                  </a:txBody>
-                  <a:tcPr>
-                    <a:solidFill>
-                      <a:schemeClr val="accent1">
-                        <a:lumMod val="20000"/>
-                        <a:lumOff val="80000"/>
-                      </a:schemeClr>
-                    </a:solidFill>
-                  </a:tcPr>
-                </a:tc>
-              </a:tr>
-              <a:tr h="361315">
-                <a:tc>
-                  <a:txBody>
-                    <a:bodyPr/>
-                    <a:lstStyle/>
-                    <a:p>
-                      <a:r>
-                        <a:rPr lang="en-US" sz="1000" smtClean="0">
-                          <a:solidFill>
-                            <a:schemeClr val="tx1">
-                              <a:lumMod val="50000"/>
-                            </a:schemeClr>
-                          </a:solidFill>
-                        </a:rPr>
-                        <a:t>KHACHHANG</a:t>
-                      </a:r>
-                      <a:endParaRPr lang="en-US" sz="1000">
-                        <a:solidFill>
-                          <a:schemeClr val="tx1">
-                            <a:lumMod val="50000"/>
-                          </a:schemeClr>
-                        </a:solidFill>
-                      </a:endParaRPr>
-                    </a:p>
-                  </a:txBody>
-                  <a:tcPr>
-                    <a:solidFill>
-                      <a:schemeClr val="bg1"/>
-                    </a:solidFill>
-                  </a:tcPr>
-                </a:tc>
-                <a:tc>
-                  <a:txBody>
-                    <a:bodyPr/>
-                    <a:lstStyle/>
-                    <a:p>
-                      <a:r>
-                        <a:rPr lang="en-US" sz="1000" smtClean="0">
-                          <a:solidFill>
-                            <a:schemeClr val="accent3">
-                              <a:lumMod val="75000"/>
-                            </a:schemeClr>
-                          </a:solidFill>
-                        </a:rPr>
-                        <a:t>MaKhachHang</a:t>
-                      </a:r>
-                      <a:endParaRPr lang="en-US" sz="1000">
-                        <a:solidFill>
-                          <a:schemeClr val="accent3">
-                            <a:lumMod val="75000"/>
-                          </a:schemeClr>
-                        </a:solidFill>
-                      </a:endParaRPr>
-                    </a:p>
-                  </a:txBody>
-                  <a:tcPr>
-                    <a:solidFill>
-                      <a:schemeClr val="accent1">
-                        <a:lumMod val="20000"/>
-                        <a:lumOff val="80000"/>
-                      </a:schemeClr>
-                    </a:solidFill>
-                  </a:tcPr>
-                </a:tc>
-                <a:tc>
-                  <a:txBody>
-                    <a:bodyPr/>
-                    <a:lstStyle/>
-                    <a:p>
-                      <a:r>
-                        <a:rPr lang="en-US" sz="1000" smtClean="0">
-                          <a:solidFill>
-                            <a:schemeClr val="accent3">
-                              <a:lumMod val="75000"/>
-                            </a:schemeClr>
-                          </a:solidFill>
-                        </a:rPr>
-                        <a:t>Ten</a:t>
-                      </a:r>
-                      <a:endParaRPr lang="en-US" sz="1000">
-                        <a:solidFill>
-                          <a:schemeClr val="accent3">
-                            <a:lumMod val="75000"/>
-                          </a:schemeClr>
-                        </a:solidFill>
-                      </a:endParaRPr>
-                    </a:p>
-                  </a:txBody>
-                  <a:tcPr>
-                    <a:solidFill>
-                      <a:schemeClr val="accent1">
-                        <a:lumMod val="20000"/>
-                        <a:lumOff val="80000"/>
-                      </a:schemeClr>
-                    </a:solidFill>
-                  </a:tcPr>
-                </a:tc>
-                <a:tc>
-                  <a:txBody>
-                    <a:bodyPr/>
-                    <a:lstStyle/>
-                    <a:p>
-                      <a:r>
-                        <a:rPr lang="en-US" sz="1000" smtClean="0">
-                          <a:solidFill>
-                            <a:schemeClr val="accent3">
-                              <a:lumMod val="75000"/>
-                            </a:schemeClr>
-                          </a:solidFill>
-                        </a:rPr>
-                        <a:t>DiaChi</a:t>
-                      </a:r>
-                      <a:endParaRPr lang="en-US" sz="1000">
-                        <a:solidFill>
-                          <a:schemeClr val="accent3">
-                            <a:lumMod val="75000"/>
-                          </a:schemeClr>
-                        </a:solidFill>
-                      </a:endParaRPr>
-                    </a:p>
-                  </a:txBody>
-                  <a:tcPr>
-                    <a:solidFill>
-                      <a:schemeClr val="accent1">
-                        <a:lumMod val="20000"/>
-                        <a:lumOff val="80000"/>
-                      </a:schemeClr>
-                    </a:solidFill>
-                  </a:tcPr>
-                </a:tc>
-                <a:tc>
-                  <a:txBody>
-                    <a:bodyPr/>
-                    <a:lstStyle/>
-                    <a:p>
-                      <a:r>
-                        <a:rPr lang="en-US" sz="1000" smtClean="0">
-                          <a:solidFill>
-                            <a:schemeClr val="accent3">
-                              <a:lumMod val="75000"/>
-                            </a:schemeClr>
-                          </a:solidFill>
-                        </a:rPr>
-                        <a:t>SDT</a:t>
-                      </a:r>
-                      <a:endParaRPr lang="en-US" sz="1000">
-                        <a:solidFill>
-                          <a:schemeClr val="accent3">
-                            <a:lumMod val="75000"/>
-                          </a:schemeClr>
-                        </a:solidFill>
-                      </a:endParaRPr>
-                    </a:p>
-                  </a:txBody>
-                  <a:tcPr>
-                    <a:solidFill>
-                      <a:schemeClr val="accent1">
-                        <a:lumMod val="20000"/>
-                        <a:lumOff val="80000"/>
-                      </a:schemeClr>
-                    </a:solidFill>
-                  </a:tcPr>
-                </a:tc>
-                <a:tc>
-                  <a:txBody>
-                    <a:bodyPr/>
-                    <a:lstStyle/>
-                    <a:p>
-                      <a:r>
-                        <a:rPr lang="en-US" sz="1000" smtClean="0">
-                          <a:solidFill>
-                            <a:schemeClr val="accent3">
-                              <a:lumMod val="75000"/>
-                            </a:schemeClr>
-                          </a:solidFill>
-                        </a:rPr>
-                        <a:t>NamSinh</a:t>
-                      </a:r>
-                      <a:endParaRPr lang="en-US" sz="1000">
-                        <a:solidFill>
-                          <a:schemeClr val="accent3">
-                            <a:lumMod val="75000"/>
-                          </a:schemeClr>
-                        </a:solidFill>
-                      </a:endParaRPr>
-                    </a:p>
-                  </a:txBody>
-                  <a:tcPr>
-                    <a:solidFill>
-                      <a:schemeClr val="accent1">
-                        <a:lumMod val="20000"/>
-                        <a:lumOff val="80000"/>
-                      </a:schemeClr>
-                    </a:solidFill>
-                  </a:tcPr>
-                </a:tc>
-                <a:tc>
-                  <a:txBody>
-                    <a:bodyPr/>
-                    <a:lstStyle/>
-                    <a:p>
-                      <a:r>
-                        <a:rPr lang="en-US" sz="1000" smtClean="0">
-                          <a:solidFill>
-                            <a:schemeClr val="accent3">
-                              <a:lumMod val="75000"/>
-                            </a:schemeClr>
-                          </a:solidFill>
-                        </a:rPr>
-                        <a:t>GioiTinh</a:t>
-                      </a:r>
-                      <a:endParaRPr lang="en-US" sz="1000">
-                        <a:solidFill>
-                          <a:schemeClr val="accent3">
-                            <a:lumMod val="75000"/>
-                          </a:schemeClr>
-                        </a:solidFill>
-                      </a:endParaRPr>
-                    </a:p>
-                  </a:txBody>
-                  <a:tcPr>
-                    <a:solidFill>
-                      <a:schemeClr val="accent1">
-                        <a:lumMod val="20000"/>
-                        <a:lumOff val="80000"/>
-                      </a:schemeClr>
-                    </a:solidFill>
-                  </a:tcPr>
-                </a:tc>
-              </a:tr>
-              <a:tr h="361315">
-                <a:tc>
-                  <a:txBody>
-                    <a:bodyPr/>
-                    <a:lstStyle/>
-                    <a:p>
-                      <a:r>
-                        <a:rPr lang="en-US" sz="1000" smtClean="0">
-                          <a:solidFill>
-                            <a:schemeClr val="tx1">
-                              <a:lumMod val="50000"/>
-                            </a:schemeClr>
-                          </a:solidFill>
-                        </a:rPr>
-                        <a:t>NHANVIEN</a:t>
-                      </a:r>
-                      <a:endParaRPr lang="en-US" sz="1000">
-                        <a:solidFill>
-                          <a:schemeClr val="tx1">
-                            <a:lumMod val="50000"/>
-                          </a:schemeClr>
-                        </a:solidFill>
-                      </a:endParaRPr>
-                    </a:p>
-                  </a:txBody>
-                  <a:tcPr>
-                    <a:solidFill>
-                      <a:schemeClr val="bg1"/>
-                    </a:solidFill>
-                  </a:tcPr>
-                </a:tc>
-                <a:tc>
-                  <a:txBody>
-                    <a:bodyPr/>
-                    <a:lstStyle/>
-                    <a:p>
-                      <a:r>
-                        <a:rPr lang="en-US" sz="1000" smtClean="0">
-                          <a:solidFill>
-                            <a:schemeClr val="accent3">
-                              <a:lumMod val="75000"/>
-                            </a:schemeClr>
-                          </a:solidFill>
-                        </a:rPr>
-                        <a:t>MaNhanVien</a:t>
-                      </a:r>
-                      <a:endParaRPr lang="en-US" sz="1000">
-                        <a:solidFill>
-                          <a:schemeClr val="accent3">
-                            <a:lumMod val="75000"/>
-                          </a:schemeClr>
-                        </a:solidFill>
-                      </a:endParaRPr>
-                    </a:p>
-                  </a:txBody>
-                  <a:tcPr>
-                    <a:solidFill>
-                      <a:schemeClr val="accent1">
-                        <a:lumMod val="20000"/>
-                        <a:lumOff val="80000"/>
-                      </a:schemeClr>
-                    </a:solidFill>
-                  </a:tcPr>
-                </a:tc>
-                <a:tc>
-                  <a:txBody>
-                    <a:bodyPr/>
-                    <a:lstStyle/>
-                    <a:p>
-                      <a:r>
-                        <a:rPr lang="en-US" sz="1000" smtClean="0">
-                          <a:solidFill>
-                            <a:schemeClr val="accent3">
-                              <a:lumMod val="75000"/>
-                            </a:schemeClr>
-                          </a:solidFill>
-                        </a:rPr>
-                        <a:t>Ten</a:t>
-                      </a:r>
-                      <a:endParaRPr lang="en-US" sz="1000">
-                        <a:solidFill>
-                          <a:schemeClr val="accent3">
-                            <a:lumMod val="75000"/>
-                          </a:schemeClr>
-                        </a:solidFill>
-                      </a:endParaRPr>
-                    </a:p>
-                  </a:txBody>
-                  <a:tcPr>
-                    <a:solidFill>
-                      <a:schemeClr val="accent1">
-                        <a:lumMod val="20000"/>
-                        <a:lumOff val="80000"/>
-                      </a:schemeClr>
-                    </a:solidFill>
-                  </a:tcPr>
-                </a:tc>
-                <a:tc>
-                  <a:txBody>
-                    <a:bodyPr/>
-                    <a:lstStyle/>
-                    <a:p>
-                      <a:r>
-                        <a:rPr lang="en-US" sz="1000" smtClean="0">
-                          <a:solidFill>
-                            <a:schemeClr val="accent3">
-                              <a:lumMod val="75000"/>
-                            </a:schemeClr>
-                          </a:solidFill>
-                        </a:rPr>
-                        <a:t>DiaChi</a:t>
-                      </a:r>
-                      <a:endParaRPr lang="en-US" sz="1000">
-                        <a:solidFill>
-                          <a:schemeClr val="accent3">
-                            <a:lumMod val="75000"/>
-                          </a:schemeClr>
-                        </a:solidFill>
-                      </a:endParaRPr>
-                    </a:p>
-                  </a:txBody>
-                  <a:tcPr>
-                    <a:solidFill>
-                      <a:schemeClr val="accent1">
-                        <a:lumMod val="20000"/>
-                        <a:lumOff val="80000"/>
-                      </a:schemeClr>
-                    </a:solidFill>
-                  </a:tcPr>
-                </a:tc>
-                <a:tc>
-                  <a:txBody>
-                    <a:bodyPr/>
-                    <a:lstStyle/>
-                    <a:p>
-                      <a:r>
-                        <a:rPr lang="en-US" sz="1000" smtClean="0">
-                          <a:solidFill>
-                            <a:schemeClr val="accent3">
-                              <a:lumMod val="75000"/>
-                            </a:schemeClr>
-                          </a:solidFill>
-                        </a:rPr>
-                        <a:t>SDT</a:t>
-                      </a:r>
-                      <a:endParaRPr lang="en-US" sz="1000">
-                        <a:solidFill>
-                          <a:schemeClr val="accent3">
-                            <a:lumMod val="75000"/>
-                          </a:schemeClr>
-                        </a:solidFill>
-                      </a:endParaRPr>
-                    </a:p>
-                  </a:txBody>
-                  <a:tcPr>
-                    <a:solidFill>
-                      <a:schemeClr val="accent1">
-                        <a:lumMod val="20000"/>
-                        <a:lumOff val="80000"/>
-                      </a:schemeClr>
-                    </a:solidFill>
-                  </a:tcPr>
-                </a:tc>
-                <a:tc>
-                  <a:txBody>
-                    <a:bodyPr/>
-                    <a:lstStyle/>
-                    <a:p>
-                      <a:r>
-                        <a:rPr lang="en-US" sz="1000" smtClean="0">
-                          <a:solidFill>
-                            <a:schemeClr val="accent3">
-                              <a:lumMod val="75000"/>
-                            </a:schemeClr>
-                          </a:solidFill>
-                        </a:rPr>
-                        <a:t>NamSinh</a:t>
-                      </a:r>
-                      <a:endParaRPr lang="en-US" sz="1000">
-                        <a:solidFill>
-                          <a:schemeClr val="accent3">
-                            <a:lumMod val="75000"/>
-                          </a:schemeClr>
-                        </a:solidFill>
-                      </a:endParaRPr>
-                    </a:p>
-                  </a:txBody>
-                  <a:tcPr>
-                    <a:solidFill>
-                      <a:schemeClr val="accent1">
-                        <a:lumMod val="20000"/>
-                        <a:lumOff val="80000"/>
-                      </a:schemeClr>
-                    </a:solidFill>
-                  </a:tcPr>
-                </a:tc>
-                <a:tc>
-                  <a:txBody>
-                    <a:bodyPr/>
-                    <a:lstStyle/>
-                    <a:p>
-                      <a:r>
-                        <a:rPr lang="en-US" sz="1000" smtClean="0">
-                          <a:solidFill>
-                            <a:schemeClr val="accent3">
-                              <a:lumMod val="75000"/>
-                            </a:schemeClr>
-                          </a:solidFill>
-                        </a:rPr>
-                        <a:t>GioiTinh</a:t>
-                      </a:r>
-                      <a:endParaRPr lang="en-US" sz="1000">
-                        <a:solidFill>
-                          <a:schemeClr val="accent3">
-                            <a:lumMod val="75000"/>
-                          </a:schemeClr>
-                        </a:solidFill>
-                      </a:endParaRPr>
-                    </a:p>
-                  </a:txBody>
-                  <a:tcPr>
-                    <a:solidFill>
-                      <a:schemeClr val="accent1">
-                        <a:lumMod val="20000"/>
-                        <a:lumOff val="80000"/>
-                      </a:schemeClr>
-                    </a:solidFill>
-                  </a:tcPr>
-                </a:tc>
-              </a:tr>
-            </a:tbl>
-          </a:graphicData>
-        </a:graphic>
-      </p:graphicFrame>
+        </p:nvSpPr>
+        <p:spPr>
+          <a:xfrm>
+            <a:off x="2445385" y="1500505"/>
+            <a:ext cx="6343015" cy="2245360"/>
+          </a:xfrm>
+          <a:prstGeom prst="rect">
+            <a:avLst/>
+          </a:prstGeom>
+          <a:noFill/>
+        </p:spPr>
+        <p:txBody>
+          <a:bodyPr wrap="square" rtlCol="0">
+            <a:spAutoFit/>
+          </a:bodyPr>
+          <a:p>
+            <a:r>
+              <a:rPr lang="en-US"/>
+              <a:t>SANPHAM( </a:t>
+            </a:r>
+            <a:r>
+              <a:rPr lang="en-US" b="1" u="sng"/>
+              <a:t>MaSanPham </a:t>
+            </a:r>
+            <a:r>
+              <a:rPr lang="en-US"/>
+              <a:t>, Ten, Gia, SoLuong, </a:t>
+            </a:r>
+            <a:r>
+              <a:rPr lang="en-US" b="1"/>
+              <a:t>MaHang, MaNhaCungCap</a:t>
+            </a:r>
+            <a:r>
+              <a:rPr lang="en-US"/>
+              <a:t>)</a:t>
+            </a:r>
+            <a:endParaRPr lang="en-US"/>
+          </a:p>
+          <a:p>
+            <a:r>
+              <a:rPr lang="en-US"/>
+              <a:t>HANG( </a:t>
+            </a:r>
+            <a:r>
+              <a:rPr lang="en-US" b="1" u="sng"/>
+              <a:t>MaHang</a:t>
+            </a:r>
+            <a:r>
+              <a:rPr lang="en-US"/>
+              <a:t>, Ten)</a:t>
+            </a:r>
+            <a:endParaRPr lang="en-US"/>
+          </a:p>
+          <a:p>
+            <a:r>
+              <a:rPr lang="en-US"/>
+              <a:t>NhaCungCap( </a:t>
+            </a:r>
+            <a:r>
+              <a:rPr lang="en-US" b="1" u="sng"/>
+              <a:t>MaNhaCungCap</a:t>
+            </a:r>
+            <a:r>
+              <a:rPr lang="en-US"/>
+              <a:t>, Ten, SDT, DiaChi) </a:t>
+            </a:r>
+            <a:endParaRPr lang="en-US"/>
+          </a:p>
+          <a:p>
+            <a:r>
+              <a:rPr lang="en-US"/>
+              <a:t>ChiTietHD( </a:t>
+            </a:r>
+            <a:r>
+              <a:rPr lang="en-US" b="1" u="sng"/>
+              <a:t>MaChiTietHD</a:t>
+            </a:r>
+            <a:r>
+              <a:rPr lang="en-US"/>
+              <a:t>, SoLuong, ThanhTien, </a:t>
+            </a:r>
+            <a:r>
+              <a:rPr lang="en-US" b="1"/>
+              <a:t>MaSanPham, MaHoaDon</a:t>
+            </a:r>
+            <a:r>
+              <a:rPr lang="en-US"/>
+              <a:t>)</a:t>
+            </a:r>
+            <a:endParaRPr lang="en-US"/>
+          </a:p>
+          <a:p>
+            <a:r>
+              <a:rPr lang="en-US"/>
+              <a:t>HoaDon( </a:t>
+            </a:r>
+            <a:r>
+              <a:rPr lang="en-US" b="1" u="sng"/>
+              <a:t>MaHoaDon</a:t>
+            </a:r>
+            <a:r>
+              <a:rPr lang="en-US"/>
+              <a:t>, TongTien, Ngay, TienShip, DiaChi, MaKhachHang, </a:t>
+            </a:r>
+            <a:r>
+              <a:rPr lang="en-US" b="1"/>
+              <a:t>MaGG</a:t>
+            </a:r>
+            <a:r>
+              <a:rPr lang="en-US"/>
+              <a:t>)</a:t>
+            </a:r>
+            <a:endParaRPr lang="en-US"/>
+          </a:p>
+          <a:p>
+            <a:r>
+              <a:rPr lang="en-US"/>
+              <a:t>MaGiamGia( </a:t>
+            </a:r>
+            <a:r>
+              <a:rPr lang="en-US" b="1" u="sng"/>
+              <a:t>MaGG</a:t>
+            </a:r>
+            <a:r>
+              <a:rPr lang="en-US"/>
+              <a:t>, SoLuong, SoTienGiam, HanSuDung, Code)</a:t>
+            </a:r>
+            <a:endParaRPr lang="en-US"/>
+          </a:p>
+          <a:p>
+            <a:r>
+              <a:rPr lang="en-US"/>
+              <a:t>KhachHang( </a:t>
+            </a:r>
+            <a:r>
+              <a:rPr lang="en-US" b="1" u="sng"/>
+              <a:t>MaKhachHang</a:t>
+            </a:r>
+            <a:r>
+              <a:rPr lang="en-US"/>
+              <a:t>, Ten, NamSinh, DiaChi, GioiTinh, SDT, </a:t>
+            </a:r>
+            <a:r>
+              <a:rPr lang="en-US" b="1"/>
+              <a:t>MaNhanVien</a:t>
+            </a:r>
+            <a:r>
+              <a:rPr lang="en-US"/>
+              <a:t>) </a:t>
+            </a:r>
+            <a:endParaRPr lang="en-US"/>
+          </a:p>
+          <a:p>
+            <a:r>
+              <a:rPr lang="en-US"/>
+              <a:t>NhanVien( </a:t>
+            </a:r>
+            <a:r>
+              <a:rPr lang="en-US" b="1" u="sng"/>
+              <a:t>MaNhanVien</a:t>
+            </a:r>
+            <a:r>
+              <a:rPr lang="en-US"/>
+              <a:t>, Ten, NamSinh, GioiTinh, SDT, DiaChi)</a:t>
+            </a:r>
+            <a:endParaRPr lang="en-US"/>
+          </a:p>
+        </p:txBody>
+      </p:sp>
     </p:spTree>
   </p:cSld>
   <p:clrMapOvr>
@@ -35542,129 +33980,7 @@
   <p:timing>
     <p:tnLst>
       <p:par>
-        <p:cTn id="1" dur="indefinite" restart="never" nodeType="tmRoot">
-          <p:childTnLst>
-            <p:seq concurrent="1" nextAc="seek">
-              <p:cTn id="2" dur="indefinite" nodeType="mainSeq">
-                <p:childTnLst>
-                  <p:par>
-                    <p:cTn id="3" fill="hold">
-                      <p:stCondLst>
-                        <p:cond delay="indefinite"/>
-                      </p:stCondLst>
-                      <p:childTnLst>
-                        <p:par>
-                          <p:cTn id="4" fill="hold">
-                            <p:stCondLst>
-                              <p:cond delay="0"/>
-                            </p:stCondLst>
-                            <p:childTnLst>
-                              <p:par>
-                                <p:cTn id="5" presetID="45" presetClass="entr" presetSubtype="0" fill="hold" nodeType="clickEffect">
-                                  <p:stCondLst>
-                                    <p:cond delay="0"/>
-                                  </p:stCondLst>
-                                  <p:childTnLst>
-                                    <p:set>
-                                      <p:cBhvr>
-                                        <p:cTn id="6" dur="1" fill="hold">
-                                          <p:stCondLst>
-                                            <p:cond delay="0"/>
-                                          </p:stCondLst>
-                                        </p:cTn>
-                                        <p:tgtEl>
-                                          <p:spTgt spid="3"/>
-                                        </p:tgtEl>
-                                        <p:attrNameLst>
-                                          <p:attrName>style.visibility</p:attrName>
-                                        </p:attrNameLst>
-                                      </p:cBhvr>
-                                      <p:to>
-                                        <p:strVal val="visible"/>
-                                      </p:to>
-                                    </p:set>
-                                    <p:animEffect transition="in" filter="fade">
-                                      <p:cBhvr>
-                                        <p:cTn id="7" dur="2000"/>
-                                        <p:tgtEl>
-                                          <p:spTgt spid="3"/>
-                                        </p:tgtEl>
-                                      </p:cBhvr>
-                                    </p:animEffect>
-                                    <p:anim calcmode="lin" valueType="num">
-                                      <p:cBhvr>
-                                        <p:cTn id="8" dur="2000" fill="hold"/>
-                                        <p:tgtEl>
-                                          <p:spTgt spid="3"/>
-                                        </p:tgtEl>
-                                        <p:attrNameLst>
-                                          <p:attrName>ppt_w</p:attrName>
-                                        </p:attrNameLst>
-                                      </p:cBhvr>
-                                      <p:tavLst>
-                                        <p:tav tm="0" fmla="#ppt_w*sin(2.5*pi*$)">
-                                          <p:val>
-                                            <p:fltVal val="0"/>
-                                          </p:val>
-                                        </p:tav>
-                                        <p:tav tm="100000">
-                                          <p:val>
-                                            <p:fltVal val="1"/>
-                                          </p:val>
-                                        </p:tav>
-                                      </p:tavLst>
-                                    </p:anim>
-                                    <p:anim calcmode="lin" valueType="num">
-                                      <p:cBhvr>
-                                        <p:cTn id="9" dur="2000" fill="hold"/>
-                                        <p:tgtEl>
-                                          <p:spTgt spid="3"/>
-                                        </p:tgtEl>
-                                        <p:attrNameLst>
-                                          <p:attrName>ppt_h</p:attrName>
-                                        </p:attrNameLst>
-                                      </p:cBhvr>
-                                      <p:tavLst>
-                                        <p:tav tm="0">
-                                          <p:val>
-                                            <p:strVal val="#ppt_h"/>
-                                          </p:val>
-                                        </p:tav>
-                                        <p:tav tm="100000">
-                                          <p:val>
-                                            <p:strVal val="#ppt_h"/>
-                                          </p:val>
-                                        </p:tav>
-                                      </p:tavLst>
-                                    </p:anim>
-                                  </p:childTnLst>
-                                </p:cTn>
-                              </p:par>
-                            </p:childTnLst>
-                          </p:cTn>
-                        </p:par>
-                      </p:childTnLst>
-                    </p:cTn>
-                  </p:par>
-                </p:childTnLst>
-              </p:cTn>
-              <p:prevCondLst>
-                <p:cond evt="onPrev" delay="0">
-                  <p:tgtEl>
-                    <p:sldTgt/>
-                  </p:tgtEl>
-                </p:cond>
-              </p:prevCondLst>
-              <p:nextCondLst>
-                <p:cond evt="onNext" delay="0">
-                  <p:tgtEl>
-                    <p:sldTgt/>
-                  </p:tgtEl>
-                </p:cond>
-              </p:nextCondLst>
-            </p:seq>
-          </p:childTnLst>
-        </p:cTn>
+        <p:cTn id="1" dur="indefinite" restart="never" nodeType="tmRoot"/>
       </p:par>
     </p:tnLst>
   </p:timing>
@@ -35711,6 +34027,81 @@
           </a:p>
         </p:txBody>
       </p:sp>
+      <p:pic>
+        <p:nvPicPr>
+          <p:cNvPr id="4" name="Picture 3" descr="ERD"/>
+          <p:cNvPicPr>
+            <a:picLocks noChangeAspect="1"/>
+          </p:cNvPicPr>
+          <p:nvPr/>
+        </p:nvPicPr>
+        <p:blipFill>
+          <a:blip r:embed="rId1"/>
+          <a:stretch>
+            <a:fillRect/>
+          </a:stretch>
+        </p:blipFill>
+        <p:spPr>
+          <a:xfrm>
+            <a:off x="-19050" y="-50165"/>
+            <a:ext cx="9260840" cy="5194300"/>
+          </a:xfrm>
+          <a:prstGeom prst="rect">
+            <a:avLst/>
+          </a:prstGeom>
+        </p:spPr>
+      </p:pic>
+    </p:spTree>
+  </p:cSld>
+  <p:clrMapOvr>
+    <a:masterClrMapping/>
+  </p:clrMapOvr>
+  <p:transition>
+    <p:fade thruBlk="1"/>
+  </p:transition>
+</p:sld>
+</file>
+
+<file path=ppt/slides/slide13.xml><?xml version="1.0" encoding="utf-8"?>
+<p:sld xmlns:a="http://schemas.openxmlformats.org/drawingml/2006/main" xmlns:r="http://schemas.openxmlformats.org/officeDocument/2006/relationships" xmlns:p="http://schemas.openxmlformats.org/presentationml/2006/main">
+  <p:cSld>
+    <p:spTree>
+      <p:nvGrpSpPr>
+        <p:cNvPr id="1" name=""/>
+        <p:cNvGrpSpPr/>
+        <p:nvPr/>
+      </p:nvGrpSpPr>
+      <p:grpSpPr/>
+      <p:sp>
+        <p:nvSpPr>
+          <p:cNvPr id="3" name="Slide Number Placeholder 2"/>
+          <p:cNvSpPr>
+            <a:spLocks noGrp="1"/>
+          </p:cNvSpPr>
+          <p:nvPr>
+            <p:ph type="sldNum" idx="12"/>
+          </p:nvPr>
+        </p:nvSpPr>
+        <p:spPr/>
+        <p:txBody>
+          <a:bodyPr/>
+          <a:p>
+            <a:pPr marL="0" lvl="0" indent="0" algn="r" rtl="0">
+              <a:spcBef>
+                <a:spcPts val="0"/>
+              </a:spcBef>
+              <a:spcAft>
+                <a:spcPts val="0"/>
+              </a:spcAft>
+              <a:buNone/>
+            </a:pPr>
+            <a:fld id="{00000000-1234-1234-1234-123412341234}" type="slidenum">
+              <a:rPr lang="en-GB"/>
+            </a:fld>
+            <a:endParaRPr lang="en-GB"/>
+          </a:p>
+        </p:txBody>
+      </p:sp>
       <p:sp>
         <p:nvSpPr>
           <p:cNvPr id="593" name="Google Shape;593;p38"/>
@@ -35723,8 +34114,8 @@
         </p:nvSpPr>
         <p:spPr>
           <a:xfrm>
-            <a:off x="3257550" y="1420495"/>
-            <a:ext cx="2860675" cy="1828800"/>
+            <a:off x="1992630" y="1420495"/>
+            <a:ext cx="5808980" cy="1828800"/>
           </a:xfrm>
           <a:prstGeom prst="rect">
             <a:avLst/>
@@ -35745,12 +34136,12 @@
               <a:buNone/>
             </a:pPr>
             <a:r>
-              <a:rPr lang="en-US" sz="6000" smtClean="0">
+              <a:rPr lang="en-US" sz="6000">
                 <a:solidFill>
                   <a:srgbClr val="FFFFFF"/>
                 </a:solidFill>
               </a:rPr>
-              <a:t>DEMO</a:t>
+              <a:t>Any Questions?</a:t>
             </a:r>
             <a:endParaRPr lang="en-US" sz="6000">
               <a:solidFill>
@@ -35771,7 +34162,7 @@
 </p:sld>
 </file>
 
-<file path=ppt/slides/slide13.xml><?xml version="1.0" encoding="utf-8"?>
+<file path=ppt/slides/slide14.xml><?xml version="1.0" encoding="utf-8"?>
 <p:sld xmlns:a="http://schemas.openxmlformats.org/drawingml/2006/main" xmlns:r="http://schemas.openxmlformats.org/officeDocument/2006/relationships" xmlns:p="http://schemas.openxmlformats.org/presentationml/2006/main">
   <p:cSld>
     <p:spTree>

</xml_diff>